<commit_message>
updated copy for the ppt
</commit_message>
<xml_diff>
--- a/09_Report_&_Presentation/Capstone_Project.pptx
+++ b/09_Report_&_Presentation/Capstone_Project.pptx
@@ -366,7 +366,7 @@
           <a:p>
             <a:fld id="{6EE7A52F-9D89-7442-A8E9-48D1527B5F6B}" type="datetimeFigureOut">
               <a:rPr lang="en-US" smtClean="0"/>
-              <a:t>4/14/2023</a:t>
+              <a:t>4/15/2023</a:t>
             </a:fld>
             <a:endParaRPr lang="en-US" dirty="0"/>
           </a:p>
@@ -2028,7 +2028,7 @@
             <a:fld id="{6FCA8E82-58CD-E045-8B98-B7A85B79B752}" type="datetime4">
               <a:rPr lang="en-US" smtClean="0"/>
               <a:pPr/>
-              <a:t>April 14, 2023</a:t>
+              <a:t>April 15, 2023</a:t>
             </a:fld>
             <a:endParaRPr lang="en-US" dirty="0">
               <a:latin typeface="+mn-lt"/>
@@ -3158,7 +3158,7 @@
             <a:fld id="{6FCA8E82-58CD-E045-8B98-B7A85B79B752}" type="datetime4">
               <a:rPr lang="en-US" smtClean="0"/>
               <a:pPr/>
-              <a:t>April 14, 2023</a:t>
+              <a:t>April 15, 2023</a:t>
             </a:fld>
             <a:endParaRPr lang="en-US" dirty="0">
               <a:latin typeface="+mn-lt"/>
@@ -4287,7 +4287,7 @@
             <a:fld id="{6FCA8E82-58CD-E045-8B98-B7A85B79B752}" type="datetime4">
               <a:rPr lang="en-US" smtClean="0"/>
               <a:pPr/>
-              <a:t>April 14, 2023</a:t>
+              <a:t>April 15, 2023</a:t>
             </a:fld>
             <a:endParaRPr lang="en-US" dirty="0">
               <a:latin typeface="+mn-lt"/>
@@ -6585,7 +6585,7 @@
             <a:fld id="{6FCA8E82-58CD-E045-8B98-B7A85B79B752}" type="datetime4">
               <a:rPr lang="en-US" smtClean="0"/>
               <a:pPr/>
-              <a:t>April 14, 2023</a:t>
+              <a:t>April 15, 2023</a:t>
             </a:fld>
             <a:endParaRPr lang="en-US" dirty="0">
               <a:latin typeface="+mn-lt"/>
@@ -7220,7 +7220,7 @@
             <a:fld id="{6FCA8E82-58CD-E045-8B98-B7A85B79B752}" type="datetime4">
               <a:rPr lang="en-US" smtClean="0"/>
               <a:pPr/>
-              <a:t>April 14, 2023</a:t>
+              <a:t>April 15, 2023</a:t>
             </a:fld>
             <a:endParaRPr lang="en-US" dirty="0">
               <a:latin typeface="+mn-lt"/>
@@ -7990,7 +7990,7 @@
             <a:fld id="{6FCA8E82-58CD-E045-8B98-B7A85B79B752}" type="datetime4">
               <a:rPr lang="en-US" smtClean="0"/>
               <a:pPr/>
-              <a:t>April 14, 2023</a:t>
+              <a:t>April 15, 2023</a:t>
             </a:fld>
             <a:endParaRPr lang="en-US" dirty="0">
               <a:latin typeface="+mn-lt"/>
@@ -8254,7 +8254,7 @@
             <a:fld id="{6FCA8E82-58CD-E045-8B98-B7A85B79B752}" type="datetime4">
               <a:rPr lang="en-US" smtClean="0"/>
               <a:pPr/>
-              <a:t>April 14, 2023</a:t>
+              <a:t>April 15, 2023</a:t>
             </a:fld>
             <a:endParaRPr lang="en-US" dirty="0">
               <a:latin typeface="+mn-lt"/>
@@ -11177,7 +11177,7 @@
             <a:fld id="{6FCA8E82-58CD-E045-8B98-B7A85B79B752}" type="datetime4">
               <a:rPr lang="en-US" smtClean="0"/>
               <a:pPr/>
-              <a:t>April 14, 2023</a:t>
+              <a:t>April 15, 2023</a:t>
             </a:fld>
             <a:endParaRPr lang="en-US" dirty="0">
               <a:latin typeface="+mn-lt"/>
@@ -12352,7 +12352,7 @@
             <a:fld id="{6FCA8E82-58CD-E045-8B98-B7A85B79B752}" type="datetime4">
               <a:rPr lang="en-US" smtClean="0"/>
               <a:pPr/>
-              <a:t>April 14, 2023</a:t>
+              <a:t>April 15, 2023</a:t>
             </a:fld>
             <a:endParaRPr lang="en-US" dirty="0">
               <a:latin typeface="+mn-lt"/>
@@ -12668,7 +12668,7 @@
             <a:fld id="{6FCA8E82-58CD-E045-8B98-B7A85B79B752}" type="datetime4">
               <a:rPr lang="en-US" smtClean="0"/>
               <a:pPr/>
-              <a:t>April 14, 2023</a:t>
+              <a:t>April 15, 2023</a:t>
             </a:fld>
             <a:endParaRPr lang="en-US" dirty="0">
               <a:latin typeface="+mn-lt"/>
@@ -13638,7 +13638,7 @@
             <a:fld id="{6FCA8E82-58CD-E045-8B98-B7A85B79B752}" type="datetime4">
               <a:rPr lang="en-US" smtClean="0"/>
               <a:pPr/>
-              <a:t>April 14, 2023</a:t>
+              <a:t>April 15, 2023</a:t>
             </a:fld>
             <a:endParaRPr lang="en-US" sz="1100" dirty="0"/>
           </a:p>
@@ -14212,7 +14212,7 @@
             <a:fld id="{6FCA8E82-58CD-E045-8B98-B7A85B79B752}" type="datetime4">
               <a:rPr lang="en-US" smtClean="0"/>
               <a:pPr/>
-              <a:t>April 14, 2023</a:t>
+              <a:t>April 15, 2023</a:t>
             </a:fld>
             <a:endParaRPr lang="en-US" dirty="0"/>
           </a:p>
@@ -14491,19 +14491,19 @@
       </p:sp>
       <p:pic>
         <p:nvPicPr>
-          <p:cNvPr id="36" name="Picture 35" descr="Text&#10;&#10;Description automatically generated">
-            <a:extLst>
-              <a:ext uri="{FF2B5EF4-FFF2-40B4-BE49-F238E27FC236}">
-                <a16:creationId xmlns:a16="http://schemas.microsoft.com/office/drawing/2014/main" id="{8674BAD1-847B-7261-1DD8-6B6706B09AB0}"/>
+          <p:cNvPr id="1026" name="Picture 2">
+            <a:extLst>
+              <a:ext uri="{FF2B5EF4-FFF2-40B4-BE49-F238E27FC236}">
+                <a16:creationId xmlns:a16="http://schemas.microsoft.com/office/drawing/2014/main" id="{2443E7D7-1B8E-6CB9-5019-2AB822FD8538}"/>
               </a:ext>
             </a:extLst>
           </p:cNvPr>
           <p:cNvPicPr>
-            <a:picLocks noChangeAspect="1"/>
+            <a:picLocks noChangeAspect="1" noChangeArrowheads="1"/>
           </p:cNvPicPr>
           <p:nvPr/>
         </p:nvPicPr>
-        <p:blipFill rotWithShape="1">
+        <p:blipFill>
           <a:blip r:embed="rId8">
             <a:extLst>
               <a:ext uri="{28A0092B-C50C-407E-A947-70E740481C1C}">
@@ -14511,17 +14511,29 @@
               </a:ext>
             </a:extLst>
           </a:blip>
-          <a:srcRect l="10017" t="595" r="11065" b="-595"/>
-          <a:stretch/>
+          <a:srcRect/>
+          <a:stretch>
+            <a:fillRect/>
+          </a:stretch>
         </p:blipFill>
-        <p:spPr>
+        <p:spPr bwMode="auto">
           <a:xfrm>
-            <a:off x="6325737" y="5688"/>
-            <a:ext cx="5866263" cy="6920551"/>
+            <a:off x="6380002" y="-24866"/>
+            <a:ext cx="5811998" cy="6858000"/>
           </a:xfrm>
           <a:prstGeom prst="rect">
             <a:avLst/>
           </a:prstGeom>
+          <a:noFill/>
+          <a:extLst>
+            <a:ext uri="{909E8E84-426E-40DD-AFC4-6F175D3DCCD1}">
+              <a14:hiddenFill xmlns:a14="http://schemas.microsoft.com/office/drawing/2010/main">
+                <a:solidFill>
+                  <a:srgbClr val="FFFFFF"/>
+                </a:solidFill>
+              </a14:hiddenFill>
+            </a:ext>
+          </a:extLst>
         </p:spPr>
       </p:pic>
     </p:spTree>
@@ -14605,7 +14617,7 @@
         </p:nvSpPr>
         <p:spPr>
           <a:xfrm>
-            <a:off x="5242253" y="3142105"/>
+            <a:off x="921203" y="2167985"/>
             <a:ext cx="2432958" cy="247651"/>
           </a:xfrm>
         </p:spPr>
@@ -14614,14 +14626,8 @@
           <a:lstStyle/>
           <a:p>
             <a:r>
-              <a:rPr lang="en-US" sz="2400" dirty="0">
-                <a:solidFill>
-                  <a:schemeClr val="bg2">
-                    <a:lumMod val="10000"/>
-                  </a:schemeClr>
-                </a:solidFill>
-              </a:rPr>
-              <a:t>Life of a Student</a:t>
+              <a:rPr lang="en-US" dirty="0"/>
+              <a:t>01. Life of a Student</a:t>
             </a:r>
           </a:p>
         </p:txBody>
@@ -14644,7 +14650,7 @@
         </p:nvSpPr>
         <p:spPr>
           <a:xfrm>
-            <a:off x="1911360" y="3181349"/>
+            <a:off x="3648710" y="2167985"/>
             <a:ext cx="3145135" cy="247651"/>
           </a:xfrm>
         </p:spPr>
@@ -14655,14 +14661,8 @@
           <a:lstStyle/>
           <a:p>
             <a:r>
-              <a:rPr lang="en-US" sz="2400" dirty="0">
-                <a:solidFill>
-                  <a:schemeClr val="bg2">
-                    <a:lumMod val="10000"/>
-                  </a:schemeClr>
-                </a:solidFill>
-              </a:rPr>
-              <a:t>Problem statement</a:t>
+              <a:rPr lang="en-US" dirty="0"/>
+              <a:t>02. Problem statement</a:t>
             </a:r>
           </a:p>
         </p:txBody>
@@ -14685,7 +14685,7 @@
         </p:nvSpPr>
         <p:spPr>
           <a:xfrm>
-            <a:off x="6458732" y="2209799"/>
+            <a:off x="971550" y="3362712"/>
             <a:ext cx="2133600" cy="205837"/>
           </a:xfrm>
         </p:spPr>
@@ -14718,8 +14718,8 @@
         </p:nvSpPr>
         <p:spPr>
           <a:xfrm>
-            <a:off x="971550" y="4509667"/>
-            <a:ext cx="2332264" cy="149419"/>
+            <a:off x="3635447" y="3367989"/>
+            <a:ext cx="2971243" cy="205837"/>
           </a:xfrm>
         </p:spPr>
         <p:txBody>
@@ -14751,7 +14751,7 @@
         </p:nvSpPr>
         <p:spPr>
           <a:xfrm>
-            <a:off x="3722370" y="4529298"/>
+            <a:off x="975905" y="4639242"/>
             <a:ext cx="2129245" cy="205837"/>
           </a:xfrm>
         </p:spPr>
@@ -14863,7 +14863,7 @@
             <a:fld id="{6FCA8E82-58CD-E045-8B98-B7A85B79B752}" type="datetime4">
               <a:rPr lang="en-US" smtClean="0"/>
               <a:pPr/>
-              <a:t>April 14, 2023</a:t>
+              <a:t>April 15, 2023</a:t>
             </a:fld>
             <a:endParaRPr lang="en-US" dirty="0"/>
           </a:p>
@@ -14885,7 +14885,7 @@
         </p:nvSpPr>
         <p:spPr>
           <a:xfrm>
-            <a:off x="6383607" y="4526317"/>
+            <a:off x="3647621" y="4540710"/>
             <a:ext cx="2129245" cy="205837"/>
           </a:xfrm>
           <a:prstGeom prst="rect">
@@ -15089,7 +15089,7 @@
         </p:nvSpPr>
         <p:spPr>
           <a:xfrm>
-            <a:off x="9004902" y="4556167"/>
+            <a:off x="6415136" y="4540710"/>
             <a:ext cx="2129245" cy="205837"/>
           </a:xfrm>
           <a:prstGeom prst="rect">
@@ -15294,7 +15294,7 @@
         </p:blipFill>
         <p:spPr>
           <a:xfrm>
-            <a:off x="964023" y="2696984"/>
+            <a:off x="964023" y="3042159"/>
             <a:ext cx="2128156" cy="139549"/>
           </a:xfrm>
           <a:prstGeom prst="rect">
@@ -15304,10 +15304,10 @@
       </p:pic>
       <p:pic>
         <p:nvPicPr>
-          <p:cNvPr id="24" name="Picture 23">
-            <a:extLst>
-              <a:ext uri="{FF2B5EF4-FFF2-40B4-BE49-F238E27FC236}">
-                <a16:creationId xmlns:a16="http://schemas.microsoft.com/office/drawing/2014/main" id="{87D01864-6BD2-2C7A-374E-CABD29267B9F}"/>
+          <p:cNvPr id="3" name="Picture 2">
+            <a:extLst>
+              <a:ext uri="{FF2B5EF4-FFF2-40B4-BE49-F238E27FC236}">
+                <a16:creationId xmlns:a16="http://schemas.microsoft.com/office/drawing/2014/main" id="{649E8CAC-CBA3-6A1C-0D82-17D582AEEAB2}"/>
               </a:ext>
             </a:extLst>
           </p:cNvPr>
@@ -15324,7 +15324,7 @@
         </p:blipFill>
         <p:spPr>
           <a:xfrm>
-            <a:off x="8924548" y="4170641"/>
+            <a:off x="3648710" y="3023511"/>
             <a:ext cx="2128156" cy="139549"/>
           </a:xfrm>
           <a:prstGeom prst="rect">
@@ -15332,51 +15332,6 @@
           </a:prstGeom>
         </p:spPr>
       </p:pic>
-      <p:cxnSp>
-        <p:nvCxnSpPr>
-          <p:cNvPr id="32" name="Straight Arrow Connector 31">
-            <a:extLst>
-              <a:ext uri="{FF2B5EF4-FFF2-40B4-BE49-F238E27FC236}">
-                <a16:creationId xmlns:a16="http://schemas.microsoft.com/office/drawing/2014/main" id="{852114CD-9307-2316-8C1F-DA48AD811AE6}"/>
-              </a:ext>
-            </a:extLst>
-          </p:cNvPr>
-          <p:cNvCxnSpPr/>
-          <p:nvPr/>
-        </p:nvCxnSpPr>
-        <p:spPr>
-          <a:xfrm>
-            <a:off x="2374710" y="2149522"/>
-            <a:ext cx="0" cy="354842"/>
-          </a:xfrm>
-          <a:prstGeom prst="straightConnector1">
-            <a:avLst/>
-          </a:prstGeom>
-          <a:ln>
-            <a:solidFill>
-              <a:schemeClr val="bg1">
-                <a:lumMod val="95000"/>
-                <a:lumOff val="5000"/>
-              </a:schemeClr>
-            </a:solidFill>
-            <a:tailEnd type="triangle"/>
-          </a:ln>
-        </p:spPr>
-        <p:style>
-          <a:lnRef idx="1">
-            <a:schemeClr val="accent1"/>
-          </a:lnRef>
-          <a:fillRef idx="0">
-            <a:schemeClr val="accent1"/>
-          </a:fillRef>
-          <a:effectRef idx="0">
-            <a:schemeClr val="accent1"/>
-          </a:effectRef>
-          <a:fontRef idx="minor">
-            <a:schemeClr val="tx1"/>
-          </a:fontRef>
-        </p:style>
-      </p:cxnSp>
     </p:spTree>
     <p:extLst>
       <p:ext uri="{BB962C8B-B14F-4D97-AF65-F5344CB8AC3E}">
@@ -15436,8 +15391,8 @@
         </p:blipFill>
         <p:spPr>
           <a:xfrm rot="10800000">
-            <a:off x="5905497" y="0"/>
-            <a:ext cx="6286502" cy="6858000"/>
+            <a:off x="6963507" y="0"/>
+            <a:ext cx="5228490" cy="6858000"/>
           </a:xfrm>
           <a:noFill/>
         </p:spPr>
@@ -15471,10 +15426,9 @@
           <a:lstStyle/>
           <a:p>
             <a:r>
-              <a:rPr lang="en-US"/>
+              <a:rPr lang="en-US" dirty="0"/>
               <a:t>Life of a Student</a:t>
             </a:r>
-            <a:endParaRPr lang="en-US" dirty="0"/>
           </a:p>
         </p:txBody>
       </p:sp>
@@ -15496,8 +15450,8 @@
         </p:nvSpPr>
         <p:spPr>
           <a:xfrm>
-            <a:off x="952499" y="2289363"/>
-            <a:ext cx="4572001" cy="2795232"/>
+            <a:off x="1182028" y="2077401"/>
+            <a:ext cx="5400443" cy="3602781"/>
           </a:xfrm>
         </p:spPr>
         <p:txBody>
@@ -15506,34 +15460,56 @@
           </a:bodyPr>
           <a:lstStyle/>
           <a:p>
+            <a:pPr algn="just"/>
             <a:r>
               <a:rPr lang="en-GB" dirty="0"/>
-              <a:t>all of us wants a better college </a:t>
-            </a:r>
-            <a:r>
-              <a:rPr lang="en-GB" dirty="0" err="1"/>
-              <a:t>experince</a:t>
+              <a:t>Achieving an </a:t>
+            </a:r>
+            <a:r>
+              <a:rPr lang="en-GB" b="1" dirty="0"/>
+              <a:t>optimal academic experience</a:t>
             </a:r>
             <a:r>
               <a:rPr lang="en-GB" dirty="0"/>
-              <a:t>, some things are in our control, some out of control</a:t>
-            </a:r>
-          </a:p>
-          <a:p>
+              <a:t> is a common goal among all college students. There are certain factors (with varying degrees of impact) that contribute to a desirable college experience such as:</a:t>
+            </a:r>
+          </a:p>
+          <a:p>
+            <a:pPr marL="285750" indent="-285750" algn="just">
+              <a:buFont typeface="Arial" panose="020B0604020202020204" pitchFamily="34" charset="0"/>
+              <a:buChar char="•"/>
+            </a:pPr>
+            <a:r>
+              <a:rPr lang="en-GB" b="1" dirty="0"/>
+              <a:t>Personal and professional background, Residential life experience, living flexibility &amp; other academic factors</a:t>
+            </a:r>
+          </a:p>
+          <a:p>
+            <a:pPr algn="just"/>
             <a:r>
               <a:rPr lang="en-GB" dirty="0"/>
-              <a:t>Factors - Living experience, back ground, flexibility and college experience </a:t>
-            </a:r>
-          </a:p>
-          <a:p>
-            <a:endParaRPr lang="en-GB" dirty="0"/>
-          </a:p>
-          <a:p>
+              <a:t>Factors, such as </a:t>
+            </a:r>
+            <a:r>
+              <a:rPr lang="en-GB" b="1" dirty="0"/>
+              <a:t>socioeconomic status, race, and ethnicity</a:t>
+            </a:r>
             <a:r>
               <a:rPr lang="en-GB" dirty="0"/>
-              <a:t>1. is there a relation? what kind of relation? what kind of factors effect it? </a:t>
-            </a:r>
-            <a:endParaRPr lang="en-US" dirty="0"/>
+              <a:t>, may also play a significant role in shaping one's college experience.</a:t>
+            </a:r>
+          </a:p>
+          <a:p>
+            <a:pPr algn="just"/>
+            <a:r>
+              <a:rPr lang="en-GB" dirty="0"/>
+              <a:t>The overall college experience can also be influenced by </a:t>
+            </a:r>
+            <a:r>
+              <a:rPr lang="en-GB" b="1" dirty="0"/>
+              <a:t>campus culture, extracurricular events, services provided and social opportunities.</a:t>
+            </a:r>
+            <a:endParaRPr lang="en-US" b="1" dirty="0"/>
           </a:p>
         </p:txBody>
       </p:sp>
@@ -15577,7 +15553,7 @@
                   <a:spcPts val="600"/>
                 </a:spcAft>
               </a:pPr>
-              <a:t>April 14, 2023</a:t>
+              <a:t>April 15, 2023</a:t>
             </a:fld>
             <a:endParaRPr lang="en-US"/>
           </a:p>
@@ -15826,7 +15802,7 @@
             <a:fld id="{6FCA8E82-58CD-E045-8B98-B7A85B79B752}" type="datetime4">
               <a:rPr lang="en-US" smtClean="0"/>
               <a:pPr/>
-              <a:t>April 14, 2023</a:t>
+              <a:t>April 15, 2023</a:t>
             </a:fld>
             <a:endParaRPr lang="en-US" dirty="0"/>
           </a:p>
@@ -15850,127 +15826,344 @@
         </p:nvSpPr>
         <p:spPr>
           <a:xfrm>
-            <a:off x="971549" y="2329292"/>
-            <a:ext cx="10062665" cy="908340"/>
+            <a:off x="971549" y="2087052"/>
+            <a:ext cx="6955269" cy="2284144"/>
           </a:xfrm>
         </p:spPr>
         <p:txBody>
           <a:bodyPr/>
           <a:lstStyle/>
           <a:p>
-            <a:r>
-              <a:rPr lang="en-GB" dirty="0"/>
-              <a:t>To investigate whether there is a correlation between demographic, academic, and living factors.  A series of surveys (two in total) will focus on identifying the challenges that students face in areas such as accommodation, transportation, educational support, college schedules, health services, and other matters.</a:t>
-            </a:r>
-          </a:p>
-          <a:p>
-            <a:r>
-              <a:rPr lang="en-GB" dirty="0"/>
-              <a:t> </a:t>
-            </a:r>
-          </a:p>
-          <a:p>
-            <a:r>
-              <a:rPr lang="en-GB" dirty="0"/>
-              <a:t>Target population: DAB program Students</a:t>
-            </a:r>
-          </a:p>
-          <a:p>
-            <a:r>
-              <a:rPr lang="en-GB" dirty="0"/>
-              <a:t>The team has come up with a hypothesis statement for the capstone project. Please find below both negative and positive aspects of the problem and the relation we want to explore on.</a:t>
-            </a:r>
-          </a:p>
-          <a:p>
-            <a:r>
-              <a:rPr lang="en-GB" dirty="0"/>
-              <a:t>Hypothesis - Positive </a:t>
-            </a:r>
-          </a:p>
-          <a:p>
-            <a:r>
-              <a:rPr lang="en-GB" dirty="0"/>
-              <a:t>1.           Students with stable work histories and relatable educational backgrounds respond positively towards academic acceptance.</a:t>
-            </a:r>
-          </a:p>
-          <a:p>
-            <a:r>
-              <a:rPr lang="en-GB" dirty="0"/>
-              <a:t>2.           Students from different demographic backgrounds and living situations show different levels of academic acceptance.</a:t>
-            </a:r>
-          </a:p>
-          <a:p>
-            <a:r>
-              <a:rPr lang="en-GB" dirty="0"/>
-              <a:t>The study can aim to outline specific challenges or obstacles encountered by different groups of students.</a:t>
-            </a:r>
-          </a:p>
-          <a:p>
+            <a:pPr algn="just"/>
+            <a:r>
+              <a:rPr lang="en-GB" b="0" i="0" dirty="0">
+                <a:solidFill>
+                  <a:srgbClr val="374151"/>
+                </a:solidFill>
+                <a:effectLst/>
+                <a:latin typeface="Söhne"/>
+              </a:rPr>
+              <a:t>The purpose of this study is to examine the relationship between </a:t>
+            </a:r>
+            <a:r>
+              <a:rPr lang="en-GB" b="1" i="0" dirty="0">
+                <a:solidFill>
+                  <a:srgbClr val="374151"/>
+                </a:solidFill>
+                <a:effectLst/>
+                <a:latin typeface="Söhne"/>
+              </a:rPr>
+              <a:t>various factors and the academic experience of students</a:t>
+            </a:r>
+            <a:r>
+              <a:rPr lang="en-GB" b="0" i="0" dirty="0">
+                <a:solidFill>
+                  <a:srgbClr val="374151"/>
+                </a:solidFill>
+                <a:effectLst/>
+                <a:latin typeface="Söhne"/>
+              </a:rPr>
+              <a:t>. Specifically, the study will focus on </a:t>
+            </a:r>
+          </a:p>
+          <a:p>
+            <a:pPr marL="285750" indent="-285750" algn="just">
+              <a:buFontTx/>
+              <a:buChar char="-"/>
+            </a:pPr>
+            <a:r>
+              <a:rPr lang="en-GB" b="0" i="0" dirty="0">
+                <a:solidFill>
+                  <a:srgbClr val="374151"/>
+                </a:solidFill>
+                <a:effectLst/>
+                <a:latin typeface="Söhne"/>
+              </a:rPr>
+              <a:t>Demographics </a:t>
+            </a:r>
+          </a:p>
+          <a:p>
+            <a:pPr marL="285750" indent="-285750" algn="just">
+              <a:buFontTx/>
+              <a:buChar char="-"/>
+            </a:pPr>
+            <a:r>
+              <a:rPr lang="en-GB" b="0" i="0" dirty="0">
+                <a:solidFill>
+                  <a:srgbClr val="374151"/>
+                </a:solidFill>
+                <a:effectLst/>
+                <a:latin typeface="Söhne"/>
+              </a:rPr>
+              <a:t>work history</a:t>
+            </a:r>
+          </a:p>
+          <a:p>
+            <a:pPr marL="285750" indent="-285750" algn="just">
+              <a:buFontTx/>
+              <a:buChar char="-"/>
+            </a:pPr>
+            <a:r>
+              <a:rPr lang="en-GB" b="0" i="0" dirty="0">
+                <a:solidFill>
+                  <a:srgbClr val="374151"/>
+                </a:solidFill>
+                <a:effectLst/>
+                <a:latin typeface="Söhne"/>
+              </a:rPr>
+              <a:t>living conditions </a:t>
+            </a:r>
+          </a:p>
+          <a:p>
+            <a:pPr algn="just"/>
+            <a:r>
+              <a:rPr lang="en-GB" b="0" i="0" dirty="0">
+                <a:solidFill>
+                  <a:srgbClr val="374151"/>
+                </a:solidFill>
+                <a:effectLst/>
+                <a:latin typeface="Söhne"/>
+              </a:rPr>
+              <a:t>to determine their impact on </a:t>
+            </a:r>
+            <a:r>
+              <a:rPr lang="en-GB" b="1" i="0" dirty="0">
+                <a:solidFill>
+                  <a:srgbClr val="374151"/>
+                </a:solidFill>
+                <a:effectLst/>
+                <a:latin typeface="Söhne"/>
+              </a:rPr>
+              <a:t>academic experience</a:t>
+            </a:r>
+            <a:r>
+              <a:rPr lang="en-GB" b="0" i="0" dirty="0">
+                <a:solidFill>
+                  <a:srgbClr val="374151"/>
+                </a:solidFill>
+                <a:effectLst/>
+                <a:latin typeface="Söhne"/>
+              </a:rPr>
+              <a:t> and overall quality of life. By identifying patterns and correlations, the study results will provide insights that could be used to </a:t>
+            </a:r>
+            <a:r>
+              <a:rPr lang="en-GB" b="1" i="0" dirty="0">
+                <a:solidFill>
+                  <a:srgbClr val="374151"/>
+                </a:solidFill>
+                <a:effectLst/>
+                <a:latin typeface="Söhne"/>
+              </a:rPr>
+              <a:t>improve</a:t>
+            </a:r>
+            <a:r>
+              <a:rPr lang="en-GB" b="0" i="0" dirty="0">
+                <a:solidFill>
+                  <a:srgbClr val="374151"/>
+                </a:solidFill>
+                <a:effectLst/>
+                <a:latin typeface="Söhne"/>
+              </a:rPr>
+              <a:t> the academic experience. </a:t>
+            </a:r>
+            <a:endParaRPr lang="en-GB" dirty="0">
+              <a:solidFill>
+                <a:srgbClr val="374151"/>
+              </a:solidFill>
+              <a:latin typeface="Söhne"/>
+            </a:endParaRPr>
+          </a:p>
+          <a:p>
+            <a:pPr algn="just"/>
             <a:endParaRPr lang="en-GB" dirty="0"/>
           </a:p>
-          <a:p>
-            <a:r>
-              <a:rPr lang="en-GB" dirty="0"/>
-              <a:t>Hypothesis - Negative</a:t>
-            </a:r>
-          </a:p>
-          <a:p>
-            <a:r>
-              <a:rPr lang="en-GB" dirty="0"/>
-              <a:t>1.	There is no significant correlation between demographics, work history, education background and living situations with academic easiness and acceptance among students.</a:t>
-            </a:r>
-          </a:p>
-          <a:p>
-            <a:endParaRPr lang="en-GB" dirty="0"/>
-          </a:p>
-          <a:p>
-            <a:endParaRPr lang="en-GB" dirty="0"/>
-          </a:p>
-          <a:p>
-            <a:r>
-              <a:rPr lang="en-GB" dirty="0"/>
-              <a:t>Probable Outcomes</a:t>
-            </a:r>
-          </a:p>
-          <a:p>
-            <a:r>
-              <a:rPr lang="en-GB" dirty="0"/>
-              <a:t>Showcase any correlation between demographic factors and ease of living/academics</a:t>
-            </a:r>
-          </a:p>
-          <a:p>
-            <a:r>
-              <a:rPr lang="en-GB" dirty="0"/>
-              <a:t>Provide high-level details on challenges faced by students</a:t>
-            </a:r>
-          </a:p>
-          <a:p>
-            <a:r>
-              <a:rPr lang="en-GB" dirty="0"/>
-              <a:t>Group data based on demographic factors</a:t>
-            </a:r>
-          </a:p>
-          <a:p>
-            <a:r>
-              <a:rPr lang="en-GB" dirty="0"/>
-              <a:t>Gather general feedback from students on their DAB experiences</a:t>
-            </a:r>
-          </a:p>
-          <a:p>
-            <a:r>
-              <a:rPr lang="en-GB" dirty="0"/>
-              <a:t>Identify the various services utilized by students</a:t>
-            </a:r>
-          </a:p>
-          <a:p>
-            <a:r>
-              <a:rPr lang="en-GB" dirty="0"/>
-              <a:t>Assess the impact of various college services in addressing student needs.</a:t>
-            </a:r>
+        </p:txBody>
+      </p:sp>
+      <p:sp>
+        <p:nvSpPr>
+          <p:cNvPr id="6" name="TextBox 5">
+            <a:extLst>
+              <a:ext uri="{FF2B5EF4-FFF2-40B4-BE49-F238E27FC236}">
+                <a16:creationId xmlns:a16="http://schemas.microsoft.com/office/drawing/2014/main" id="{ED8F6821-E433-75A5-5743-C857505E39DC}"/>
+              </a:ext>
+            </a:extLst>
+          </p:cNvPr>
+          <p:cNvSpPr txBox="1"/>
+          <p:nvPr/>
+        </p:nvSpPr>
+        <p:spPr>
+          <a:xfrm>
+            <a:off x="8862606" y="3366932"/>
+            <a:ext cx="2303973" cy="861774"/>
+          </a:xfrm>
+          <a:prstGeom prst="rect">
+            <a:avLst/>
+          </a:prstGeom>
+          <a:noFill/>
+        </p:spPr>
+        <p:txBody>
+          <a:bodyPr wrap="square" rtlCol="0">
+            <a:spAutoFit/>
+          </a:bodyPr>
+          <a:lstStyle/>
+          <a:p>
+            <a:r>
+              <a:rPr lang="en-GB" sz="1600" b="1" dirty="0">
+                <a:solidFill>
+                  <a:srgbClr val="374151"/>
+                </a:solidFill>
+                <a:latin typeface="Söhne"/>
+              </a:rPr>
+              <a:t>Target population: </a:t>
+            </a:r>
+          </a:p>
+          <a:p>
+            <a:r>
+              <a:rPr lang="en-GB" sz="1600" dirty="0">
+                <a:solidFill>
+                  <a:srgbClr val="374151"/>
+                </a:solidFill>
+                <a:latin typeface="Söhne"/>
+              </a:rPr>
+              <a:t>DAB program Students</a:t>
+            </a:r>
+          </a:p>
+          <a:p>
             <a:endParaRPr lang="en-US" dirty="0"/>
           </a:p>
         </p:txBody>
       </p:sp>
+      <p:sp>
+        <p:nvSpPr>
+          <p:cNvPr id="7" name="TextBox 6">
+            <a:extLst>
+              <a:ext uri="{FF2B5EF4-FFF2-40B4-BE49-F238E27FC236}">
+                <a16:creationId xmlns:a16="http://schemas.microsoft.com/office/drawing/2014/main" id="{97FE8DA8-EA3C-CD01-1DB0-486DB9317DA3}"/>
+              </a:ext>
+            </a:extLst>
+          </p:cNvPr>
+          <p:cNvSpPr txBox="1"/>
+          <p:nvPr/>
+        </p:nvSpPr>
+        <p:spPr>
+          <a:xfrm>
+            <a:off x="964023" y="4788577"/>
+            <a:ext cx="6962795" cy="1106970"/>
+          </a:xfrm>
+          <a:prstGeom prst="rect">
+            <a:avLst/>
+          </a:prstGeom>
+          <a:noFill/>
+        </p:spPr>
+        <p:txBody>
+          <a:bodyPr wrap="square" rtlCol="0">
+            <a:spAutoFit/>
+          </a:bodyPr>
+          <a:lstStyle/>
+          <a:p>
+            <a:pPr marL="0" marR="0" lvl="0" indent="0" algn="l" defTabSz="914400" rtl="0" eaLnBrk="1" fontAlgn="auto" latinLnBrk="0" hangingPunct="1">
+              <a:lnSpc>
+                <a:spcPct val="90000"/>
+              </a:lnSpc>
+              <a:spcBef>
+                <a:spcPts val="1000"/>
+              </a:spcBef>
+              <a:spcAft>
+                <a:spcPts val="0"/>
+              </a:spcAft>
+              <a:buClrTx/>
+              <a:buSzTx/>
+              <a:buFont typeface="Arial" panose="020B0604020202020204" pitchFamily="34" charset="0"/>
+              <a:buNone/>
+              <a:tabLst/>
+              <a:defRPr/>
+            </a:pPr>
+            <a:r>
+              <a:rPr kumimoji="0" lang="en-GB" sz="1600" b="1" i="0" u="sng" strike="noStrike" kern="1200" cap="none" spc="0" normalizeH="0" baseline="0" noProof="0" dirty="0">
+                <a:ln>
+                  <a:noFill/>
+                </a:ln>
+                <a:solidFill>
+                  <a:srgbClr val="000000"/>
+                </a:solidFill>
+                <a:effectLst/>
+                <a:uLnTx/>
+                <a:uFillTx/>
+                <a:latin typeface="Franklin Gothic Book"/>
+                <a:ea typeface="+mn-ea"/>
+                <a:cs typeface="+mn-cs"/>
+              </a:rPr>
+              <a:t>Hypothesis</a:t>
+            </a:r>
+          </a:p>
+          <a:p>
+            <a:pPr marL="0" marR="0" lvl="0" indent="0" algn="l" defTabSz="914400" rtl="0" eaLnBrk="1" fontAlgn="auto" latinLnBrk="0" hangingPunct="1">
+              <a:lnSpc>
+                <a:spcPct val="90000"/>
+              </a:lnSpc>
+              <a:spcBef>
+                <a:spcPts val="1000"/>
+              </a:spcBef>
+              <a:spcAft>
+                <a:spcPts val="0"/>
+              </a:spcAft>
+              <a:buClrTx/>
+              <a:buSzTx/>
+              <a:buFont typeface="Arial" panose="020B0604020202020204" pitchFamily="34" charset="0"/>
+              <a:buNone/>
+              <a:tabLst/>
+              <a:defRPr/>
+            </a:pPr>
+            <a:r>
+              <a:rPr kumimoji="0" lang="en-GB" sz="1600" b="0" i="0" u="none" strike="noStrike" kern="1200" cap="none" spc="0" normalizeH="0" baseline="0" noProof="0" dirty="0">
+                <a:ln>
+                  <a:noFill/>
+                </a:ln>
+                <a:solidFill>
+                  <a:srgbClr val="000000"/>
+                </a:solidFill>
+                <a:effectLst/>
+                <a:uLnTx/>
+                <a:uFillTx/>
+                <a:latin typeface="Franklin Gothic Book"/>
+                <a:ea typeface="+mn-ea"/>
+                <a:cs typeface="+mn-cs"/>
+              </a:rPr>
+              <a:t>Students who have stable work histories, relatable educational backgrounds, and better living situations are more likely to have a positive academic experience</a:t>
+            </a:r>
+          </a:p>
+        </p:txBody>
+      </p:sp>
+      <p:pic>
+        <p:nvPicPr>
+          <p:cNvPr id="8" name="Picture 7">
+            <a:extLst>
+              <a:ext uri="{FF2B5EF4-FFF2-40B4-BE49-F238E27FC236}">
+                <a16:creationId xmlns:a16="http://schemas.microsoft.com/office/drawing/2014/main" id="{CD90E639-A86F-4987-CD1C-07662FE45BEF}"/>
+              </a:ext>
+            </a:extLst>
+          </p:cNvPr>
+          <p:cNvPicPr>
+            <a:picLocks noChangeAspect="1"/>
+          </p:cNvPicPr>
+          <p:nvPr/>
+        </p:nvPicPr>
+        <p:blipFill>
+          <a:blip r:embed="rId2"/>
+          <a:stretch>
+            <a:fillRect/>
+          </a:stretch>
+        </p:blipFill>
+        <p:spPr>
+          <a:xfrm>
+            <a:off x="971549" y="4535005"/>
+            <a:ext cx="2128156" cy="139549"/>
+          </a:xfrm>
+          <a:prstGeom prst="rect">
+            <a:avLst/>
+          </a:prstGeom>
+        </p:spPr>
+      </p:pic>
     </p:spTree>
     <p:extLst>
       <p:ext uri="{BB962C8B-B14F-4D97-AF65-F5344CB8AC3E}">
@@ -16131,7 +16324,7 @@
             <a:fld id="{6FCA8E82-58CD-E045-8B98-B7A85B79B752}" type="datetime4">
               <a:rPr lang="en-US" smtClean="0"/>
               <a:pPr/>
-              <a:t>April 14, 2023</a:t>
+              <a:t>April 15, 2023</a:t>
             </a:fld>
             <a:endParaRPr lang="en-US" dirty="0"/>
           </a:p>
@@ -16151,8 +16344,8 @@
         </p:nvSpPr>
         <p:spPr>
           <a:xfrm>
-            <a:off x="1201003" y="2013045"/>
-            <a:ext cx="7997588" cy="1754326"/>
+            <a:off x="971551" y="2013045"/>
+            <a:ext cx="7379162" cy="3170099"/>
           </a:xfrm>
           <a:prstGeom prst="rect">
             <a:avLst/>
@@ -16165,6 +16358,138 @@
           </a:bodyPr>
           <a:lstStyle/>
           <a:p>
+            <a:pPr algn="just"/>
+            <a:r>
+              <a:rPr lang="en-GB" sz="1600" b="1" dirty="0">
+                <a:solidFill>
+                  <a:srgbClr val="374151"/>
+                </a:solidFill>
+                <a:latin typeface="Söhne"/>
+              </a:rPr>
+              <a:t>Central objective: </a:t>
+            </a:r>
+            <a:r>
+              <a:rPr lang="en-GB" sz="1600" dirty="0">
+                <a:solidFill>
+                  <a:srgbClr val="374151"/>
+                </a:solidFill>
+                <a:latin typeface="Söhne"/>
+              </a:rPr>
+              <a:t>To devise </a:t>
+            </a:r>
+            <a:r>
+              <a:rPr lang="en-GB" sz="1600" b="1" dirty="0">
+                <a:solidFill>
+                  <a:srgbClr val="374151"/>
+                </a:solidFill>
+                <a:latin typeface="Söhne"/>
+              </a:rPr>
+              <a:t>an automated and self-sufficient system </a:t>
+            </a:r>
+            <a:r>
+              <a:rPr lang="en-GB" sz="1600" dirty="0">
+                <a:solidFill>
+                  <a:srgbClr val="374151"/>
+                </a:solidFill>
+                <a:latin typeface="Söhne"/>
+              </a:rPr>
+              <a:t>that can proficiently showcase the </a:t>
+            </a:r>
+            <a:r>
+              <a:rPr lang="en-GB" sz="1600" b="1" dirty="0">
+                <a:solidFill>
+                  <a:srgbClr val="374151"/>
+                </a:solidFill>
+                <a:latin typeface="Söhne"/>
+              </a:rPr>
+              <a:t>correlations between diverse factors and a student's academic experience</a:t>
+            </a:r>
+            <a:r>
+              <a:rPr lang="en-GB" sz="1600" dirty="0">
+                <a:solidFill>
+                  <a:srgbClr val="374151"/>
+                </a:solidFill>
+                <a:latin typeface="Söhne"/>
+              </a:rPr>
+              <a:t>, while also </a:t>
+            </a:r>
+            <a:r>
+              <a:rPr lang="en-GB" sz="1600" b="1" dirty="0">
+                <a:solidFill>
+                  <a:srgbClr val="374151"/>
+                </a:solidFill>
+                <a:latin typeface="Söhne"/>
+              </a:rPr>
+              <a:t>forecasting the influence and potency </a:t>
+            </a:r>
+            <a:r>
+              <a:rPr lang="en-GB" sz="1600" dirty="0">
+                <a:solidFill>
+                  <a:srgbClr val="374151"/>
+                </a:solidFill>
+                <a:latin typeface="Söhne"/>
+              </a:rPr>
+              <a:t>of these factors on the same.</a:t>
+            </a:r>
+          </a:p>
+          <a:p>
+            <a:pPr algn="just"/>
+            <a:endParaRPr lang="en-GB" sz="1600" dirty="0">
+              <a:solidFill>
+                <a:srgbClr val="374151"/>
+              </a:solidFill>
+              <a:latin typeface="Söhne"/>
+            </a:endParaRPr>
+          </a:p>
+          <a:p>
+            <a:pPr algn="just"/>
+            <a:r>
+              <a:rPr lang="en-GB" sz="1600" dirty="0">
+                <a:solidFill>
+                  <a:srgbClr val="374151"/>
+                </a:solidFill>
+                <a:latin typeface="Söhne"/>
+              </a:rPr>
+              <a:t>The solution's scope extends beyond providing insights solely on academic experience, as it also aims to illuminate Student-College relationship. </a:t>
+            </a:r>
+            <a:r>
+              <a:rPr lang="en-GB" sz="1600" b="0" i="0" dirty="0">
+                <a:solidFill>
+                  <a:srgbClr val="374151"/>
+                </a:solidFill>
+                <a:effectLst/>
+                <a:latin typeface="Söhne"/>
+              </a:rPr>
+              <a:t>The implementation of this solution will ultimately enhance the academic experience for students.</a:t>
+            </a:r>
+            <a:endParaRPr lang="en-GB" sz="1600" dirty="0">
+              <a:solidFill>
+                <a:srgbClr val="374151"/>
+              </a:solidFill>
+              <a:latin typeface="Söhne"/>
+            </a:endParaRPr>
+          </a:p>
+          <a:p>
+            <a:pPr algn="just"/>
+            <a:endParaRPr lang="en-US" dirty="0">
+              <a:solidFill>
+                <a:schemeClr val="bg2">
+                  <a:lumMod val="10000"/>
+                </a:schemeClr>
+              </a:solidFill>
+            </a:endParaRPr>
+          </a:p>
+          <a:p>
+            <a:pPr algn="just"/>
+            <a:r>
+              <a:rPr lang="en-US" sz="1600" b="1" dirty="0">
+                <a:solidFill>
+                  <a:srgbClr val="374151"/>
+                </a:solidFill>
+                <a:latin typeface="Söhne"/>
+              </a:rPr>
+              <a:t>Solution in Nutshell</a:t>
+            </a:r>
             <a:r>
               <a:rPr lang="en-US" dirty="0">
                 <a:solidFill>
@@ -16173,155 +16498,224 @@
                   </a:schemeClr>
                 </a:solidFill>
               </a:rPr>
-              <a:t>to use all </a:t>
-            </a:r>
-            <a:r>
-              <a:rPr lang="en-US" dirty="0" err="1">
+              <a:t>: </a:t>
+            </a:r>
+            <a:r>
+              <a:rPr lang="en-US" sz="1600" dirty="0">
                 <a:solidFill>
-                  <a:schemeClr val="bg2">
-                    <a:lumMod val="10000"/>
-                  </a:schemeClr>
+                  <a:srgbClr val="374151"/>
                 </a:solidFill>
+                <a:latin typeface="Söhne"/>
               </a:rPr>
-              <a:t>phadses</a:t>
-            </a:r>
-            <a:r>
-              <a:rPr lang="en-US" dirty="0">
+              <a:t>S</a:t>
+            </a:r>
+            <a:r>
+              <a:rPr lang="en-GB" sz="1600" dirty="0" err="1">
                 <a:solidFill>
-                  <a:schemeClr val="bg2">
-                    <a:lumMod val="10000"/>
-                  </a:schemeClr>
+                  <a:srgbClr val="374151"/>
                 </a:solidFill>
+                <a:latin typeface="Söhne"/>
               </a:rPr>
-              <a:t> </a:t>
-            </a:r>
-            <a:r>
-              <a:rPr lang="en-US" dirty="0" err="1">
+              <a:t>eries</a:t>
+            </a:r>
+            <a:r>
+              <a:rPr lang="en-GB" sz="1600" dirty="0">
                 <a:solidFill>
-                  <a:schemeClr val="bg2">
-                    <a:lumMod val="10000"/>
-                  </a:schemeClr>
+                  <a:srgbClr val="374151"/>
                 </a:solidFill>
+                <a:latin typeface="Söhne"/>
               </a:rPr>
-              <a:t>fo</a:t>
-            </a:r>
-            <a:r>
-              <a:rPr lang="en-US" dirty="0">
-                <a:solidFill>
-                  <a:schemeClr val="bg2">
-                    <a:lumMod val="10000"/>
-                  </a:schemeClr>
-                </a:solidFill>
-              </a:rPr>
-              <a:t> a data journey  (collection  -- pre processing -- transformation -- prediction - outcomes)</a:t>
-            </a:r>
-          </a:p>
-          <a:p>
-            <a:r>
-              <a:rPr lang="en-US" dirty="0">
-                <a:solidFill>
-                  <a:schemeClr val="bg2">
-                    <a:lumMod val="10000"/>
-                  </a:schemeClr>
-                </a:solidFill>
-              </a:rPr>
-              <a:t>Primary sol: Data story - jo journey </a:t>
-            </a:r>
-            <a:r>
-              <a:rPr lang="en-US" dirty="0" err="1">
-                <a:solidFill>
-                  <a:schemeClr val="bg2">
-                    <a:lumMod val="10000"/>
-                  </a:schemeClr>
-                </a:solidFill>
-              </a:rPr>
-              <a:t>batayega</a:t>
-            </a:r>
-            <a:r>
-              <a:rPr lang="en-US" dirty="0">
-                <a:solidFill>
-                  <a:schemeClr val="bg2">
-                    <a:lumMod val="10000"/>
-                  </a:schemeClr>
-                </a:solidFill>
-              </a:rPr>
-              <a:t> - Student background se </a:t>
-            </a:r>
-            <a:r>
-              <a:rPr lang="en-US" dirty="0" err="1">
-                <a:solidFill>
-                  <a:schemeClr val="bg2">
-                    <a:lumMod val="10000"/>
-                  </a:schemeClr>
-                </a:solidFill>
-              </a:rPr>
-              <a:t>leke</a:t>
-            </a:r>
-            <a:r>
-              <a:rPr lang="en-US" dirty="0">
-                <a:solidFill>
-                  <a:schemeClr val="bg2">
-                    <a:lumMod val="10000"/>
-                  </a:schemeClr>
-                </a:solidFill>
-              </a:rPr>
-              <a:t> </a:t>
-            </a:r>
-            <a:r>
-              <a:rPr lang="en-US" dirty="0" err="1">
-                <a:solidFill>
-                  <a:schemeClr val="bg2">
-                    <a:lumMod val="10000"/>
-                  </a:schemeClr>
-                </a:solidFill>
-              </a:rPr>
-              <a:t>uske</a:t>
-            </a:r>
-            <a:r>
-              <a:rPr lang="en-US" dirty="0">
-                <a:solidFill>
-                  <a:schemeClr val="bg2">
-                    <a:lumMod val="10000"/>
-                  </a:schemeClr>
-                </a:solidFill>
-              </a:rPr>
-              <a:t> academic </a:t>
-            </a:r>
-            <a:r>
-              <a:rPr lang="en-US" dirty="0" err="1">
-                <a:solidFill>
-                  <a:schemeClr val="bg2">
-                    <a:lumMod val="10000"/>
-                  </a:schemeClr>
-                </a:solidFill>
-              </a:rPr>
-              <a:t>exproience</a:t>
-            </a:r>
-            <a:r>
-              <a:rPr lang="en-US" dirty="0">
-                <a:solidFill>
-                  <a:schemeClr val="bg2">
-                    <a:lumMod val="10000"/>
-                  </a:schemeClr>
-                </a:solidFill>
-              </a:rPr>
-              <a:t> connection</a:t>
-            </a:r>
-          </a:p>
-          <a:p>
-            <a:r>
-              <a:rPr lang="en-US" dirty="0">
-                <a:solidFill>
-                  <a:schemeClr val="bg2">
-                    <a:lumMod val="10000"/>
-                  </a:schemeClr>
-                </a:solidFill>
-              </a:rPr>
-              <a:t>extra: short useful insights regarding student's feedback towards services, college </a:t>
-            </a:r>
-          </a:p>
-        </p:txBody>
-      </p:sp>
+              <a:t> of interactive Tableau dashboards that provide a detailed overview of the data journey, from initial background information to academic outcomes and predictive analysis</a:t>
+            </a:r>
+            <a:endParaRPr lang="en-US" sz="1600" dirty="0">
+              <a:solidFill>
+                <a:srgbClr val="374151"/>
+              </a:solidFill>
+              <a:latin typeface="Söhne"/>
+            </a:endParaRPr>
+          </a:p>
+        </p:txBody>
+      </p:sp>
+      <p:pic>
+        <p:nvPicPr>
+          <p:cNvPr id="2" name="Picture 1">
+            <a:extLst>
+              <a:ext uri="{FF2B5EF4-FFF2-40B4-BE49-F238E27FC236}">
+                <a16:creationId xmlns:a16="http://schemas.microsoft.com/office/drawing/2014/main" id="{BF4B1668-9B07-7CB3-0D4E-BEEBFA08B945}"/>
+              </a:ext>
+            </a:extLst>
+          </p:cNvPr>
+          <p:cNvPicPr>
+            <a:picLocks noChangeAspect="1"/>
+          </p:cNvPicPr>
+          <p:nvPr/>
+        </p:nvPicPr>
+        <p:blipFill>
+          <a:blip r:embed="rId2"/>
+          <a:stretch>
+            <a:fillRect/>
+          </a:stretch>
+        </p:blipFill>
+        <p:spPr>
+          <a:xfrm>
+            <a:off x="971550" y="1705674"/>
+            <a:ext cx="2128156" cy="139549"/>
+          </a:xfrm>
+          <a:prstGeom prst="rect">
+            <a:avLst/>
+          </a:prstGeom>
+        </p:spPr>
+      </p:pic>
+      <p:pic>
+        <p:nvPicPr>
+          <p:cNvPr id="9" name="Picture 8">
+            <a:extLst>
+              <a:ext uri="{FF2B5EF4-FFF2-40B4-BE49-F238E27FC236}">
+                <a16:creationId xmlns:a16="http://schemas.microsoft.com/office/drawing/2014/main" id="{BCF21398-D1FE-BA69-C322-965BD2F9EF06}"/>
+              </a:ext>
+            </a:extLst>
+          </p:cNvPr>
+          <p:cNvPicPr>
+            <a:picLocks noChangeAspect="1"/>
+          </p:cNvPicPr>
+          <p:nvPr/>
+        </p:nvPicPr>
+        <p:blipFill>
+          <a:blip r:embed="rId3"/>
+          <a:stretch>
+            <a:fillRect/>
+          </a:stretch>
+        </p:blipFill>
+        <p:spPr>
+          <a:xfrm>
+            <a:off x="8590462" y="95354"/>
+            <a:ext cx="1872000" cy="1083090"/>
+          </a:xfrm>
+          <a:prstGeom prst="rect">
+            <a:avLst/>
+          </a:prstGeom>
+        </p:spPr>
+      </p:pic>
+      <p:pic>
+        <p:nvPicPr>
+          <p:cNvPr id="10" name="Picture 9">
+            <a:extLst>
+              <a:ext uri="{FF2B5EF4-FFF2-40B4-BE49-F238E27FC236}">
+                <a16:creationId xmlns:a16="http://schemas.microsoft.com/office/drawing/2014/main" id="{52B7165B-C9B3-1825-E93C-B78D6473A5A1}"/>
+              </a:ext>
+            </a:extLst>
+          </p:cNvPr>
+          <p:cNvPicPr>
+            <a:picLocks noChangeAspect="1"/>
+          </p:cNvPicPr>
+          <p:nvPr/>
+        </p:nvPicPr>
+        <p:blipFill>
+          <a:blip r:embed="rId3"/>
+          <a:stretch>
+            <a:fillRect/>
+          </a:stretch>
+        </p:blipFill>
+        <p:spPr>
+          <a:xfrm>
+            <a:off x="10184102" y="1390433"/>
+            <a:ext cx="1872000" cy="1083090"/>
+          </a:xfrm>
+          <a:prstGeom prst="rect">
+            <a:avLst/>
+          </a:prstGeom>
+        </p:spPr>
+      </p:pic>
+      <p:pic>
+        <p:nvPicPr>
+          <p:cNvPr id="11" name="Picture 10">
+            <a:extLst>
+              <a:ext uri="{FF2B5EF4-FFF2-40B4-BE49-F238E27FC236}">
+                <a16:creationId xmlns:a16="http://schemas.microsoft.com/office/drawing/2014/main" id="{96E63A4F-3C55-F068-5BF7-A0586C8367E7}"/>
+              </a:ext>
+            </a:extLst>
+          </p:cNvPr>
+          <p:cNvPicPr>
+            <a:picLocks noChangeAspect="1"/>
+          </p:cNvPicPr>
+          <p:nvPr/>
+        </p:nvPicPr>
+        <p:blipFill>
+          <a:blip r:embed="rId3"/>
+          <a:stretch>
+            <a:fillRect/>
+          </a:stretch>
+        </p:blipFill>
+        <p:spPr>
+          <a:xfrm>
+            <a:off x="8590462" y="2685512"/>
+            <a:ext cx="1872000" cy="1083090"/>
+          </a:xfrm>
+          <a:prstGeom prst="rect">
+            <a:avLst/>
+          </a:prstGeom>
+        </p:spPr>
+      </p:pic>
+      <p:pic>
+        <p:nvPicPr>
+          <p:cNvPr id="12" name="Picture 11">
+            <a:extLst>
+              <a:ext uri="{FF2B5EF4-FFF2-40B4-BE49-F238E27FC236}">
+                <a16:creationId xmlns:a16="http://schemas.microsoft.com/office/drawing/2014/main" id="{67084072-5535-5C3E-7A52-00261880A5DD}"/>
+              </a:ext>
+            </a:extLst>
+          </p:cNvPr>
+          <p:cNvPicPr>
+            <a:picLocks noChangeAspect="1"/>
+          </p:cNvPicPr>
+          <p:nvPr/>
+        </p:nvPicPr>
+        <p:blipFill>
+          <a:blip r:embed="rId3"/>
+          <a:stretch>
+            <a:fillRect/>
+          </a:stretch>
+        </p:blipFill>
+        <p:spPr>
+          <a:xfrm>
+            <a:off x="10184101" y="3980591"/>
+            <a:ext cx="1872000" cy="1083090"/>
+          </a:xfrm>
+          <a:prstGeom prst="rect">
+            <a:avLst/>
+          </a:prstGeom>
+        </p:spPr>
+      </p:pic>
+      <p:pic>
+        <p:nvPicPr>
+          <p:cNvPr id="13" name="Picture 12">
+            <a:extLst>
+              <a:ext uri="{FF2B5EF4-FFF2-40B4-BE49-F238E27FC236}">
+                <a16:creationId xmlns:a16="http://schemas.microsoft.com/office/drawing/2014/main" id="{D55FBEE8-3F59-CA58-E99A-268140A9DAB2}"/>
+              </a:ext>
+            </a:extLst>
+          </p:cNvPr>
+          <p:cNvPicPr>
+            <a:picLocks noChangeAspect="1"/>
+          </p:cNvPicPr>
+          <p:nvPr/>
+        </p:nvPicPr>
+        <p:blipFill>
+          <a:blip r:embed="rId3"/>
+          <a:stretch>
+            <a:fillRect/>
+          </a:stretch>
+        </p:blipFill>
+        <p:spPr>
+          <a:xfrm>
+            <a:off x="8590462" y="5382847"/>
+            <a:ext cx="1872000" cy="1083090"/>
+          </a:xfrm>
+          <a:prstGeom prst="rect">
+            <a:avLst/>
+          </a:prstGeom>
+        </p:spPr>
+      </p:pic>
     </p:spTree>
     <p:extLst>
       <p:ext uri="{BB962C8B-B14F-4D97-AF65-F5344CB8AC3E}">
@@ -16484,7 +16878,7 @@
             <a:fld id="{6FCA8E82-58CD-E045-8B98-B7A85B79B752}" type="datetime4">
               <a:rPr lang="en-US" smtClean="0"/>
               <a:pPr/>
-              <a:t>April 14, 2023</a:t>
+              <a:t>April 15, 2023</a:t>
             </a:fld>
             <a:endParaRPr lang="en-US" dirty="0"/>
           </a:p>
@@ -16505,7 +16899,7 @@
         <p:spPr>
           <a:xfrm>
             <a:off x="1555844" y="2101756"/>
-            <a:ext cx="7560544" cy="1477328"/>
+            <a:ext cx="7560544" cy="2585323"/>
           </a:xfrm>
           <a:prstGeom prst="rect">
             <a:avLst/>
@@ -16573,6 +16967,76 @@
               </a:rPr>
               <a:t>Story board explanation of the dashboard</a:t>
             </a:r>
+          </a:p>
+          <a:p>
+            <a:endParaRPr lang="en-US" dirty="0">
+              <a:solidFill>
+                <a:schemeClr val="bg2">
+                  <a:lumMod val="10000"/>
+                </a:schemeClr>
+              </a:solidFill>
+            </a:endParaRPr>
+          </a:p>
+          <a:p>
+            <a:r>
+              <a:rPr lang="en-US" dirty="0">
+                <a:solidFill>
+                  <a:schemeClr val="bg2">
+                    <a:lumMod val="10000"/>
+                  </a:schemeClr>
+                </a:solidFill>
+              </a:rPr>
+              <a:t>to use all </a:t>
+            </a:r>
+            <a:r>
+              <a:rPr lang="en-US" dirty="0" err="1">
+                <a:solidFill>
+                  <a:schemeClr val="bg2">
+                    <a:lumMod val="10000"/>
+                  </a:schemeClr>
+                </a:solidFill>
+              </a:rPr>
+              <a:t>phadses</a:t>
+            </a:r>
+            <a:r>
+              <a:rPr lang="en-US" dirty="0">
+                <a:solidFill>
+                  <a:schemeClr val="bg2">
+                    <a:lumMod val="10000"/>
+                  </a:schemeClr>
+                </a:solidFill>
+              </a:rPr>
+              <a:t> </a:t>
+            </a:r>
+            <a:r>
+              <a:rPr lang="en-US" dirty="0" err="1">
+                <a:solidFill>
+                  <a:schemeClr val="bg2">
+                    <a:lumMod val="10000"/>
+                  </a:schemeClr>
+                </a:solidFill>
+              </a:rPr>
+              <a:t>fo</a:t>
+            </a:r>
+            <a:r>
+              <a:rPr lang="en-US" dirty="0">
+                <a:solidFill>
+                  <a:schemeClr val="bg2">
+                    <a:lumMod val="10000"/>
+                  </a:schemeClr>
+                </a:solidFill>
+              </a:rPr>
+              <a:t> a data journey  (collection  -- pre processing -- transformation -- prediction - outcomes)</a:t>
+            </a:r>
+          </a:p>
+          <a:p>
+            <a:endParaRPr lang="en-US" dirty="0">
+              <a:solidFill>
+                <a:schemeClr val="bg2">
+                  <a:lumMod val="10000"/>
+                </a:schemeClr>
+              </a:solidFill>
+            </a:endParaRPr>
           </a:p>
         </p:txBody>
       </p:sp>
@@ -17151,7 +17615,7 @@
             <a:fld id="{6FCA8E82-58CD-E045-8B98-B7A85B79B752}" type="datetime4">
               <a:rPr lang="en-US" smtClean="0"/>
               <a:pPr/>
-              <a:t>April 14, 2023</a:t>
+              <a:t>April 15, 2023</a:t>
             </a:fld>
             <a:endParaRPr lang="en-US" sz="1100" dirty="0"/>
           </a:p>
@@ -17962,15 +18426,6 @@
 </file>
 
 <file path=customXml/item1.xml><?xml version="1.0" encoding="utf-8"?>
-<p:properties xmlns:p="http://schemas.microsoft.com/office/2006/metadata/properties" xmlns:xsi="http://www.w3.org/2001/XMLSchema-instance" xmlns:pc="http://schemas.microsoft.com/office/infopath/2007/PartnerControls">
-  <documentManagement>
-    <Status xmlns="71af3243-3dd4-4a8d-8c0d-dd76da1f02a5">Not started</Status>
-    <MediaServiceKeyPoints xmlns="71af3243-3dd4-4a8d-8c0d-dd76da1f02a5" xsi:nil="true"/>
-  </documentManagement>
-</p:properties>
-</file>
-
-<file path=customXml/item2.xml><?xml version="1.0" encoding="utf-8"?>
 <ct:contentTypeSchema xmlns:ct="http://schemas.microsoft.com/office/2006/metadata/contentType" xmlns:ma="http://schemas.microsoft.com/office/2006/metadata/properties/metaAttributes" ct:_="" ma:_="" ma:contentTypeName="Document" ma:contentTypeID="0x01010079F111ED35F8CC479449609E8A0923A6" ma:contentTypeVersion="12" ma:contentTypeDescription="Create a new document." ma:contentTypeScope="" ma:versionID="426e97fa315356fffbdcd9876fe988c2">
   <xsd:schema xmlns:xsd="http://www.w3.org/2001/XMLSchema" xmlns:xs="http://www.w3.org/2001/XMLSchema" xmlns:p="http://schemas.microsoft.com/office/2006/metadata/properties" xmlns:ns2="71af3243-3dd4-4a8d-8c0d-dd76da1f02a5" xmlns:ns3="16c05727-aa75-4e4a-9b5f-8a80a1165891" targetNamespace="http://schemas.microsoft.com/office/2006/metadata/properties" ma:root="true" ma:fieldsID="14b8f0def80e6d70ce3def20c90759ae" ns2:_="" ns3:_="">
     <xsd:import namespace="71af3243-3dd4-4a8d-8c0d-dd76da1f02a5"/>
@@ -18191,6 +18646,15 @@
 </ct:contentTypeSchema>
 </file>
 
+<file path=customXml/item2.xml><?xml version="1.0" encoding="utf-8"?>
+<p:properties xmlns:p="http://schemas.microsoft.com/office/2006/metadata/properties" xmlns:xsi="http://www.w3.org/2001/XMLSchema-instance" xmlns:pc="http://schemas.microsoft.com/office/infopath/2007/PartnerControls">
+  <documentManagement>
+    <Status xmlns="71af3243-3dd4-4a8d-8c0d-dd76da1f02a5">Not started</Status>
+    <MediaServiceKeyPoints xmlns="71af3243-3dd4-4a8d-8c0d-dd76da1f02a5" xsi:nil="true"/>
+  </documentManagement>
+</p:properties>
+</file>
+
 <file path=customXml/item3.xml><?xml version="1.0" encoding="utf-8"?>
 <?mso-contentType ?>
 <FormTemplates xmlns="http://schemas.microsoft.com/sharepoint/v3/contenttype/forms">
@@ -18201,16 +18665,6 @@
 </file>
 
 <file path=customXml/itemProps1.xml><?xml version="1.0" encoding="utf-8"?>
-<ds:datastoreItem xmlns:ds="http://schemas.openxmlformats.org/officeDocument/2006/customXml" ds:itemID="{09EC1AB0-9704-404D-B6D3-819D938AC55B}">
-  <ds:schemaRefs>
-    <ds:schemaRef ds:uri="http://schemas.microsoft.com/office/2006/metadata/properties"/>
-    <ds:schemaRef ds:uri="http://schemas.microsoft.com/office/infopath/2007/PartnerControls"/>
-    <ds:schemaRef ds:uri="71af3243-3dd4-4a8d-8c0d-dd76da1f02a5"/>
-  </ds:schemaRefs>
-</ds:datastoreItem>
-</file>
-
-<file path=customXml/itemProps2.xml><?xml version="1.0" encoding="utf-8"?>
 <ds:datastoreItem xmlns:ds="http://schemas.openxmlformats.org/officeDocument/2006/customXml" ds:itemID="{94F21D10-BD83-491A-AAA6-945C2DB1EB01}">
   <ds:schemaRefs>
     <ds:schemaRef ds:uri="http://schemas.microsoft.com/office/2006/metadata/contentType"/>
@@ -18229,6 +18683,16 @@
 </ds:datastoreItem>
 </file>
 
+<file path=customXml/itemProps2.xml><?xml version="1.0" encoding="utf-8"?>
+<ds:datastoreItem xmlns:ds="http://schemas.openxmlformats.org/officeDocument/2006/customXml" ds:itemID="{09EC1AB0-9704-404D-B6D3-819D938AC55B}">
+  <ds:schemaRefs>
+    <ds:schemaRef ds:uri="http://schemas.microsoft.com/office/2006/metadata/properties"/>
+    <ds:schemaRef ds:uri="http://schemas.microsoft.com/office/infopath/2007/PartnerControls"/>
+    <ds:schemaRef ds:uri="71af3243-3dd4-4a8d-8c0d-dd76da1f02a5"/>
+  </ds:schemaRefs>
+</ds:datastoreItem>
+</file>
+
 <file path=customXml/itemProps3.xml><?xml version="1.0" encoding="utf-8"?>
 <ds:datastoreItem xmlns:ds="http://schemas.openxmlformats.org/officeDocument/2006/customXml" ds:itemID="{1D20B6E4-879E-4E6C-BDE7-261540CD3765}">
   <ds:schemaRefs>

</xml_diff>